<commit_message>
Logistic Regression Notebook updated
</commit_message>
<xml_diff>
--- a/C3.Classification_LogReg/figs/Figs.pptx
+++ b/C3.Classification_LogReg/figs/Figs.pptx
@@ -243,7 +243,7 @@
           <a:p>
             <a:fld id="{CD89D5C7-A9AF-F84A-990C-55E12C397535}" type="datetimeFigureOut">
               <a:rPr lang="en-US" smtClean="0"/>
-              <a:t>10/12/16</a:t>
+              <a:t>10/20/17</a:t>
             </a:fld>
             <a:endParaRPr lang="en-US"/>
           </a:p>
@@ -413,7 +413,7 @@
           <a:p>
             <a:fld id="{CD89D5C7-A9AF-F84A-990C-55E12C397535}" type="datetimeFigureOut">
               <a:rPr lang="en-US" smtClean="0"/>
-              <a:t>10/12/16</a:t>
+              <a:t>10/20/17</a:t>
             </a:fld>
             <a:endParaRPr lang="en-US"/>
           </a:p>
@@ -593,7 +593,7 @@
           <a:p>
             <a:fld id="{CD89D5C7-A9AF-F84A-990C-55E12C397535}" type="datetimeFigureOut">
               <a:rPr lang="en-US" smtClean="0"/>
-              <a:t>10/12/16</a:t>
+              <a:t>10/20/17</a:t>
             </a:fld>
             <a:endParaRPr lang="en-US"/>
           </a:p>
@@ -763,7 +763,7 @@
           <a:p>
             <a:fld id="{CD89D5C7-A9AF-F84A-990C-55E12C397535}" type="datetimeFigureOut">
               <a:rPr lang="en-US" smtClean="0"/>
-              <a:t>10/12/16</a:t>
+              <a:t>10/20/17</a:t>
             </a:fld>
             <a:endParaRPr lang="en-US"/>
           </a:p>
@@ -1009,7 +1009,7 @@
           <a:p>
             <a:fld id="{CD89D5C7-A9AF-F84A-990C-55E12C397535}" type="datetimeFigureOut">
               <a:rPr lang="en-US" smtClean="0"/>
-              <a:t>10/12/16</a:t>
+              <a:t>10/20/17</a:t>
             </a:fld>
             <a:endParaRPr lang="en-US"/>
           </a:p>
@@ -1241,7 +1241,7 @@
           <a:p>
             <a:fld id="{CD89D5C7-A9AF-F84A-990C-55E12C397535}" type="datetimeFigureOut">
               <a:rPr lang="en-US" smtClean="0"/>
-              <a:t>10/12/16</a:t>
+              <a:t>10/20/17</a:t>
             </a:fld>
             <a:endParaRPr lang="en-US"/>
           </a:p>
@@ -1608,7 +1608,7 @@
           <a:p>
             <a:fld id="{CD89D5C7-A9AF-F84A-990C-55E12C397535}" type="datetimeFigureOut">
               <a:rPr lang="en-US" smtClean="0"/>
-              <a:t>10/12/16</a:t>
+              <a:t>10/20/17</a:t>
             </a:fld>
             <a:endParaRPr lang="en-US"/>
           </a:p>
@@ -1726,7 +1726,7 @@
           <a:p>
             <a:fld id="{CD89D5C7-A9AF-F84A-990C-55E12C397535}" type="datetimeFigureOut">
               <a:rPr lang="en-US" smtClean="0"/>
-              <a:t>10/12/16</a:t>
+              <a:t>10/20/17</a:t>
             </a:fld>
             <a:endParaRPr lang="en-US"/>
           </a:p>
@@ -1821,7 +1821,7 @@
           <a:p>
             <a:fld id="{CD89D5C7-A9AF-F84A-990C-55E12C397535}" type="datetimeFigureOut">
               <a:rPr lang="en-US" smtClean="0"/>
-              <a:t>10/12/16</a:t>
+              <a:t>10/20/17</a:t>
             </a:fld>
             <a:endParaRPr lang="en-US"/>
           </a:p>
@@ -2098,7 +2098,7 @@
           <a:p>
             <a:fld id="{CD89D5C7-A9AF-F84A-990C-55E12C397535}" type="datetimeFigureOut">
               <a:rPr lang="en-US" smtClean="0"/>
-              <a:t>10/12/16</a:t>
+              <a:t>10/20/17</a:t>
             </a:fld>
             <a:endParaRPr lang="en-US"/>
           </a:p>
@@ -2351,7 +2351,7 @@
           <a:p>
             <a:fld id="{CD89D5C7-A9AF-F84A-990C-55E12C397535}" type="datetimeFigureOut">
               <a:rPr lang="en-US" smtClean="0"/>
-              <a:t>10/12/16</a:t>
+              <a:t>10/20/17</a:t>
             </a:fld>
             <a:endParaRPr lang="en-US"/>
           </a:p>
@@ -2564,7 +2564,7 @@
           <a:p>
             <a:fld id="{CD89D5C7-A9AF-F84A-990C-55E12C397535}" type="datetimeFigureOut">
               <a:rPr lang="en-US" smtClean="0"/>
-              <a:t>10/12/16</a:t>
+              <a:t>10/20/17</a:t>
             </a:fld>
             <a:endParaRPr lang="en-US"/>
           </a:p>
@@ -2978,9 +2978,9 @@
         <p:grpSpPr>
           <a:xfrm>
             <a:off x="838964" y="3011706"/>
-            <a:ext cx="4906006" cy="1728922"/>
+            <a:ext cx="4906006" cy="1817822"/>
             <a:chOff x="838964" y="3011706"/>
-            <a:chExt cx="4906006" cy="1728922"/>
+            <a:chExt cx="4906006" cy="1817822"/>
           </a:xfrm>
         </p:grpSpPr>
         <p:grpSp>
@@ -2992,9 +2992,9 @@
           <p:grpSpPr>
             <a:xfrm>
               <a:off x="838964" y="3011706"/>
-              <a:ext cx="3453636" cy="1645129"/>
+              <a:ext cx="3453636" cy="1728922"/>
               <a:chOff x="858014" y="990121"/>
-              <a:chExt cx="3453636" cy="1645129"/>
+              <a:chExt cx="3453636" cy="1728922"/>
             </a:xfrm>
           </p:grpSpPr>
           <p:sp>
@@ -3177,7 +3177,7 @@
             <p:spPr>
               <a:xfrm>
                 <a:off x="2470149" y="2133601"/>
-                <a:ext cx="1219199" cy="501649"/>
+                <a:ext cx="1219199" cy="585442"/>
               </a:xfrm>
               <a:prstGeom prst="roundRect">
                 <a:avLst/>
@@ -3210,15 +3210,15 @@
               <a:p>
                 <a:pPr algn="ctr"/>
                 <a:r>
-                  <a:rPr lang="en-US" dirty="0" smtClean="0"/>
-                  <a:t>Decider</a:t>
+                  <a:rPr lang="en-US" smtClean="0"/>
+                  <a:t>Decision Maker</a:t>
                 </a:r>
                 <a:endParaRPr lang="en-US" dirty="0"/>
               </a:p>
             </p:txBody>
           </p:sp>
-          <mc:AlternateContent xmlns:mc="http://schemas.openxmlformats.org/markup-compatibility/2006" xmlns:a14="http://schemas.microsoft.com/office/drawing/2010/main">
-            <mc:Choice Requires="a14">
+          <mc:AlternateContent xmlns:mc="http://schemas.openxmlformats.org/markup-compatibility/2006">
+            <mc:Choice xmlns:a14="http://schemas.microsoft.com/office/drawing/2010/main" Requires="a14">
               <p:sp>
                 <p:nvSpPr>
                   <p:cNvPr id="93" name="TextBox 92"/>
@@ -3227,7 +3227,7 @@
                 </p:nvSpPr>
                 <p:spPr>
                   <a:xfrm>
-                    <a:off x="1806957" y="2203451"/>
+                    <a:off x="1806957" y="2216151"/>
                     <a:ext cx="373886" cy="369333"/>
                   </a:xfrm>
                   <a:prstGeom prst="rect">
@@ -3268,7 +3268,7 @@
                 </p:txBody>
               </p:sp>
             </mc:Choice>
-            <mc:Fallback xmlns="">
+            <mc:Fallback>
               <p:sp>
                 <p:nvSpPr>
                   <p:cNvPr id="93" name="TextBox 92"/>
@@ -3279,7 +3279,7 @@
                 </p:nvSpPr>
                 <p:spPr>
                   <a:xfrm>
-                    <a:off x="1806957" y="2203451"/>
+                    <a:off x="1806957" y="2216151"/>
                     <a:ext cx="373886" cy="369333"/>
                   </a:xfrm>
                   <a:prstGeom prst="rect">
@@ -3315,7 +3315,7 @@
             </p:nvCxnSpPr>
             <p:spPr>
               <a:xfrm flipV="1">
-                <a:off x="2180843" y="2384426"/>
+                <a:off x="2180843" y="2428876"/>
                 <a:ext cx="289306" cy="3692"/>
               </a:xfrm>
               <a:prstGeom prst="bentConnector3">
@@ -3353,7 +3353,7 @@
             </p:nvCxnSpPr>
             <p:spPr>
               <a:xfrm flipV="1">
-                <a:off x="3689348" y="2381767"/>
+                <a:off x="3689348" y="2426217"/>
                 <a:ext cx="352806" cy="2659"/>
               </a:xfrm>
               <a:prstGeom prst="bentConnector3">
@@ -3542,7 +3542,7 @@
           </p:blipFill>
           <p:spPr>
             <a:xfrm>
-              <a:off x="4034024" y="3900296"/>
+              <a:off x="4034024" y="3989196"/>
               <a:ext cx="1710946" cy="840332"/>
             </a:xfrm>
             <a:prstGeom prst="rect">

</xml_diff>